<commit_message>
Image width and height
</commit_message>
<xml_diff>
--- a/examples/output.pptx
+++ b/examples/output.pptx
@@ -9,7 +9,6 @@
     <p:sldId id="257" r:id="rId8"/>
     <p:sldId id="258" r:id="rId9"/>
     <p:sldId id="259" r:id="rId10"/>
-    <p:sldId id="260" r:id="rId11"/>
   </p:sldIdLst>
   <p:sldSz cx="9144000" cy="6858000" type="screen4x3"/>
   <p:notesSz cx="6858000" cy="9144000"/>
@@ -3108,7 +3107,7 @@
           <a:lstStyle/>
           <a:p>
             <a:r>
-              <a:t>my sample slide</a:t>
+              <a:t>Hello World! example</a:t>
             </a:r>
           </a:p>
         </p:txBody>
@@ -3127,7 +3126,11 @@
         <p:txBody>
           <a:bodyPr/>
           <a:lstStyle/>
-          <a:p/>
+          <a:p>
+            <a:r>
+              <a:t>python-pptx was here!</a:t>
+            </a:r>
+          </a:p>
         </p:txBody>
       </p:sp>
     </p:spTree>
@@ -3164,7 +3167,7 @@
           <a:lstStyle/>
           <a:p>
             <a:r>
-              <a:t>title of a Content slide</a:t>
+              <a:t>Adding a Bullet Slide</a:t>
             </a:r>
           </a:p>
         </p:txBody>
@@ -3186,17 +3189,19 @@
           <a:p/>
           <a:p>
             <a:r>
-              <a:t>this paragraph</a:t>
-            </a:r>
-          </a:p>
-          <a:p>
-            <a:r>
-              <a:t>that paragraph</a:t>
-            </a:r>
-          </a:p>
-          <a:p>
-            <a:r>
-              <a:t>the other paragraph</a:t>
+              <a:t>Use h3 for bullet slide layout</a:t>
+            </a:r>
+          </a:p>
+          <a:p>
+            <a:pPr lvl="1"/>
+            <a:r>
+              <a:t>Use h4 for first bullet</a:t>
+            </a:r>
+          </a:p>
+          <a:p>
+            <a:pPr lvl="2"/>
+            <a:r>
+              <a:t>Use h5 for subsequent bullet</a:t>
             </a:r>
           </a:p>
         </p:txBody>
@@ -3219,77 +3224,6 @@
         <p:nvPr/>
       </p:nvGrpSpPr>
       <p:grpSpPr/>
-      <p:sp>
-        <p:nvSpPr>
-          <p:cNvPr id="2" name="Title 1"/>
-          <p:cNvSpPr>
-            <a:spLocks noGrp="1"/>
-          </p:cNvSpPr>
-          <p:nvPr>
-            <p:ph type="title"/>
-          </p:nvPr>
-        </p:nvSpPr>
-        <p:spPr/>
-        <p:txBody>
-          <a:bodyPr/>
-          <a:lstStyle/>
-          <a:p>
-            <a:r>
-              <a:t>another title of a Content slide</a:t>
-            </a:r>
-          </a:p>
-        </p:txBody>
-      </p:sp>
-      <p:sp>
-        <p:nvSpPr>
-          <p:cNvPr id="3" name="Content Placeholder 2"/>
-          <p:cNvSpPr>
-            <a:spLocks noGrp="1"/>
-          </p:cNvSpPr>
-          <p:nvPr>
-            <p:ph idx="1"/>
-          </p:nvPr>
-        </p:nvSpPr>
-        <p:spPr/>
-        <p:txBody>
-          <a:bodyPr/>
-          <a:lstStyle/>
-          <a:p/>
-          <a:p>
-            <a:r>
-              <a:t>this paragraph</a:t>
-            </a:r>
-          </a:p>
-          <a:p>
-            <a:pPr lvl="1"/>
-            <a:r>
-              <a:t>that paragraph</a:t>
-            </a:r>
-          </a:p>
-          <a:p>
-            <a:pPr lvl="2"/>
-            <a:r>
-              <a:t>the other paragraph</a:t>
-            </a:r>
-          </a:p>
-          <a:p>
-            <a:r>
-              <a:t>this paragraph</a:t>
-            </a:r>
-          </a:p>
-          <a:p>
-            <a:r>
-              <a:t>that paragraph</a:t>
-            </a:r>
-          </a:p>
-          <a:p>
-            <a:pPr lvl="2"/>
-            <a:r>
-              <a:t>the other paragraph</a:t>
-            </a:r>
-          </a:p>
-        </p:txBody>
-      </p:sp>
     </p:spTree>
   </p:cSld>
   <p:clrMapOvr>
@@ -3299,80 +3233,6 @@
 </file>
 
 <file path=ppt/slides/slide4.xml><?xml version="1.0" encoding="utf-8"?>
-<p:sld xmlns:a="http://schemas.openxmlformats.org/drawingml/2006/main" xmlns:p="http://schemas.openxmlformats.org/presentationml/2006/main" xmlns:r="http://schemas.openxmlformats.org/officeDocument/2006/relationships">
-  <p:cSld>
-    <p:spTree>
-      <p:nvGrpSpPr>
-        <p:cNvPr id="1" name=""/>
-        <p:cNvGrpSpPr/>
-        <p:nvPr/>
-      </p:nvGrpSpPr>
-      <p:grpSpPr/>
-      <p:sp>
-        <p:nvSpPr>
-          <p:cNvPr id="2" name="TextBox 1"/>
-          <p:cNvSpPr txBox="1"/>
-          <p:nvPr/>
-        </p:nvSpPr>
-        <p:spPr>
-          <a:xfrm>
-            <a:off x="914400" y="914400"/>
-            <a:ext cx="914400" cy="914400"/>
-          </a:xfrm>
-          <a:prstGeom prst="rect">
-            <a:avLst/>
-          </a:prstGeom>
-          <a:noFill/>
-        </p:spPr>
-        <p:txBody>
-          <a:bodyPr wrap="none">
-            <a:spAutoFit/>
-          </a:bodyPr>
-          <a:lstStyle/>
-          <a:p>
-            <a:r>
-              <a:t>This is a second paragraph that's bold</a:t>
-            </a:r>
-          </a:p>
-        </p:txBody>
-      </p:sp>
-      <p:sp>
-        <p:nvSpPr>
-          <p:cNvPr id="3" name="TextBox 2"/>
-          <p:cNvSpPr txBox="1"/>
-          <p:nvPr/>
-        </p:nvSpPr>
-        <p:spPr>
-          <a:xfrm>
-            <a:off x="914400" y="914400"/>
-            <a:ext cx="914400" cy="914400"/>
-          </a:xfrm>
-          <a:prstGeom prst="rect">
-            <a:avLst/>
-          </a:prstGeom>
-          <a:noFill/>
-        </p:spPr>
-        <p:txBody>
-          <a:bodyPr wrap="none">
-            <a:spAutoFit/>
-          </a:bodyPr>
-          <a:lstStyle/>
-          <a:p>
-            <a:r>
-              <a:t>This is a third paragraph that's big</a:t>
-            </a:r>
-          </a:p>
-        </p:txBody>
-      </p:sp>
-    </p:spTree>
-  </p:cSld>
-  <p:clrMapOvr>
-    <a:masterClrMapping/>
-  </p:clrMapOvr>
-</p:sld>
-</file>
-
-<file path=ppt/slides/slide5.xml><?xml version="1.0" encoding="utf-8"?>
 <p:sld xmlns:a="http://schemas.openxmlformats.org/drawingml/2006/main" xmlns:p="http://schemas.openxmlformats.org/presentationml/2006/main" xmlns:r="http://schemas.openxmlformats.org/officeDocument/2006/relationships">
   <p:cSld>
     <p:spTree>
@@ -3399,6 +3259,30 @@
         <p:spPr>
           <a:xfrm>
             <a:off x="914400" y="914400"/>
+            <a:ext cx="914400" cy="914400"/>
+          </a:xfrm>
+          <a:prstGeom prst="rect">
+            <a:avLst/>
+          </a:prstGeom>
+        </p:spPr>
+      </p:pic>
+      <p:pic>
+        <p:nvPicPr>
+          <p:cNvPr id="3" name="Picture 2" descr="shizubar.png"/>
+          <p:cNvPicPr>
+            <a:picLocks noChangeAspect="1"/>
+          </p:cNvPicPr>
+          <p:nvPr/>
+        </p:nvPicPr>
+        <p:blipFill>
+          <a:blip r:embed="rId2"/>
+          <a:stretch>
+            <a:fillRect/>
+          </a:stretch>
+        </p:blipFill>
+        <p:spPr>
+          <a:xfrm>
+            <a:off x="2743200" y="914400"/>
             <a:ext cx="5080000" cy="5080000"/>
           </a:xfrm>
           <a:prstGeom prst="rect">

</xml_diff>